<commit_message>
1차발표 ppt 완성 (#91)
</commit_message>
<xml_diff>
--- a/0. document/5. PPT/0. 프로젝트 주제.pptx
+++ b/0. document/5. PPT/0. 프로젝트 주제.pptx
@@ -1,27 +1,27 @@
 
 <file path=ppt/presentation.xml><?xml version="1.0" encoding="utf-8"?>
-<p:presentation xmlns:r="http://schemas.openxmlformats.org/officeDocument/2006/relationships" xmlns:c="http://schemas.openxmlformats.org/drawingml/2006/chart" xmlns:a="http://schemas.openxmlformats.org/drawingml/2006/main" xmlns:dgm="http://schemas.openxmlformats.org/drawingml/2006/diagram" xmlns:dsp="http://schemas.microsoft.com/office/drawing/2008/diagram" xmlns:p="http://schemas.openxmlformats.org/presentationml/2006/main" showSpecialPlsOnTitleSld="0" saveSubsetFonts="1">
+<p:presentation xmlns:a="http://schemas.openxmlformats.org/drawingml/2006/main" xmlns:r="http://schemas.openxmlformats.org/officeDocument/2006/relationships" xmlns:p="http://schemas.openxmlformats.org/presentationml/2006/main" showSpecialPlsOnTitleSld="0" saveSubsetFonts="1">
   <p:sldMasterIdLst>
     <p:sldMasterId id="2147483663" r:id="rId1"/>
   </p:sldMasterIdLst>
   <p:notesMasterIdLst>
-    <p:notesMasterId r:id="rId2"/>
+    <p:notesMasterId r:id="rId16"/>
   </p:notesMasterIdLst>
   <p:sldIdLst>
-    <p:sldId id="256" r:id="rId3"/>
-    <p:sldId id="257" r:id="rId4"/>
-    <p:sldId id="258" r:id="rId5"/>
-    <p:sldId id="259" r:id="rId6"/>
-    <p:sldId id="260" r:id="rId7"/>
-    <p:sldId id="261" r:id="rId8"/>
-    <p:sldId id="262" r:id="rId9"/>
-    <p:sldId id="263" r:id="rId10"/>
-    <p:sldId id="264" r:id="rId11"/>
-    <p:sldId id="265" r:id="rId12"/>
-    <p:sldId id="266" r:id="rId13"/>
-    <p:sldId id="267" r:id="rId14"/>
-    <p:sldId id="268" r:id="rId15"/>
-    <p:sldId id="269" r:id="rId16"/>
+    <p:sldId id="256" r:id="rId2"/>
+    <p:sldId id="257" r:id="rId3"/>
+    <p:sldId id="258" r:id="rId4"/>
+    <p:sldId id="259" r:id="rId5"/>
+    <p:sldId id="260" r:id="rId6"/>
+    <p:sldId id="261" r:id="rId7"/>
+    <p:sldId id="262" r:id="rId8"/>
+    <p:sldId id="263" r:id="rId9"/>
+    <p:sldId id="264" r:id="rId10"/>
+    <p:sldId id="265" r:id="rId11"/>
+    <p:sldId id="266" r:id="rId12"/>
+    <p:sldId id="267" r:id="rId13"/>
+    <p:sldId id="268" r:id="rId14"/>
+    <p:sldId id="269" r:id="rId15"/>
   </p:sldIdLst>
   <p:sldSz cx="12192000" cy="6858000"/>
   <p:notesSz cx="6858000" cy="9144000"/>
@@ -120,11 +120,16 @@
       </a:defRPr>
     </a:lvl9pPr>
   </p:defaultTextStyle>
+  <p:extLst>
+    <p:ext uri="{EFAFB233-063F-42B5-8137-9DF3F51BA10A}">
+      <p15:sldGuideLst xmlns:p15="http://schemas.microsoft.com/office/powerpoint/2012/main"/>
+    </p:ext>
+  </p:extLst>
 </p:presentation>
 </file>
 
 <file path=ppt/notesMasters/notesMaster1.xml><?xml version="1.0" encoding="utf-8"?>
-<p:notesMaster xmlns:r="http://schemas.openxmlformats.org/officeDocument/2006/relationships" xmlns:c="http://schemas.openxmlformats.org/drawingml/2006/chart" xmlns:a="http://schemas.openxmlformats.org/drawingml/2006/main" xmlns:dgm="http://schemas.openxmlformats.org/drawingml/2006/diagram" xmlns:dsp="http://schemas.microsoft.com/office/drawing/2008/diagram" xmlns:p="http://schemas.openxmlformats.org/presentationml/2006/main">
+<p:notesMaster xmlns:a="http://schemas.openxmlformats.org/drawingml/2006/main" xmlns:r="http://schemas.openxmlformats.org/officeDocument/2006/relationships" xmlns:p="http://schemas.openxmlformats.org/presentationml/2006/main">
   <p:cSld>
     <p:bg>
       <p:bgRef idx="1001">
@@ -152,7 +157,7 @@
             <a:spLocks noGrp="1"/>
           </p:cNvSpPr>
           <p:nvPr>
-            <p:ph type="hdr" sz="quarter" idx="0"/>
+            <p:ph type="hdr" sz="quarter"/>
           </p:nvPr>
         </p:nvSpPr>
         <p:spPr>
@@ -175,10 +180,6 @@
             <a:pPr lvl="0">
               <a:defRPr/>
             </a:pPr>
-            <a:r>
-              <a:rPr lang="ko-KR" altLang="en-US"/>
-              <a:t/>
-            </a:r>
             <a:endParaRPr lang="ko-KR" altLang="en-US"/>
           </a:p>
         </p:txBody>
@@ -218,7 +219,7 @@
               <a:pPr lvl="0">
                 <a:defRPr/>
               </a:pPr>
-              <a:t>2019-03-18</a:t>
+              <a:t>2019-03-19</a:t>
             </a:fld>
             <a:endParaRPr lang="ko-KR" altLang="en-US"/>
           </a:p>
@@ -290,7 +291,6 @@
               <a:rPr lang="ko-KR" altLang="en-US"/>
               <a:t>마스터 텍스트 스타일을 편집하려면 클릭</a:t>
             </a:r>
-            <a:endParaRPr lang="ko-KR" altLang="en-US"/>
           </a:p>
           <a:p>
             <a:pPr lvl="1">
@@ -300,7 +300,6 @@
               <a:rPr lang="ko-KR" altLang="en-US"/>
               <a:t>두 번째 수준</a:t>
             </a:r>
-            <a:endParaRPr lang="ko-KR" altLang="en-US"/>
           </a:p>
           <a:p>
             <a:pPr lvl="2">
@@ -310,7 +309,6 @@
               <a:rPr lang="ko-KR" altLang="en-US"/>
               <a:t>세 번째 수준</a:t>
             </a:r>
-            <a:endParaRPr lang="ko-KR" altLang="en-US"/>
           </a:p>
           <a:p>
             <a:pPr lvl="3">
@@ -320,7 +318,6 @@
               <a:rPr lang="ko-KR" altLang="en-US"/>
               <a:t>네 번째 수준</a:t>
             </a:r>
-            <a:endParaRPr lang="ko-KR" altLang="en-US"/>
           </a:p>
           <a:p>
             <a:pPr lvl="4">
@@ -330,7 +327,6 @@
               <a:rPr lang="ko-KR" altLang="en-US"/>
               <a:t>다섯 번째 수준</a:t>
             </a:r>
-            <a:endParaRPr lang="ko-KR" altLang="en-US"/>
           </a:p>
         </p:txBody>
       </p:sp>
@@ -364,10 +360,6 @@
             <a:pPr lvl="0">
               <a:defRPr/>
             </a:pPr>
-            <a:r>
-              <a:rPr lang="ko-KR" altLang="en-US"/>
-              <a:t/>
-            </a:r>
             <a:endParaRPr lang="ko-KR" altLang="en-US"/>
           </a:p>
         </p:txBody>
@@ -513,7 +505,7 @@
 </file>
 
 <file path=ppt/notesSlides/notesSlide1.xml><?xml version="1.0" encoding="utf-8"?>
-<p:notes xmlns:r="http://schemas.openxmlformats.org/officeDocument/2006/relationships" xmlns:c="http://schemas.openxmlformats.org/drawingml/2006/chart" xmlns:a="http://schemas.openxmlformats.org/drawingml/2006/main" xmlns:dgm="http://schemas.openxmlformats.org/drawingml/2006/diagram" xmlns:dsp="http://schemas.microsoft.com/office/drawing/2008/diagram" xmlns:p="http://schemas.openxmlformats.org/presentationml/2006/main">
+<p:notes xmlns:a="http://schemas.openxmlformats.org/drawingml/2006/main" xmlns:r="http://schemas.openxmlformats.org/officeDocument/2006/relationships" xmlns:p="http://schemas.openxmlformats.org/presentationml/2006/main">
   <p:cSld>
     <p:spTree>
       <p:nvGrpSpPr>
@@ -536,7 +528,7 @@
             <a:spLocks noGrp="1" noRot="1" noChangeAspect="1" noTextEdit="1"/>
           </p:cNvSpPr>
           <p:nvPr>
-            <p:ph type="sldImg" idx="0"/>
+            <p:ph type="sldImg"/>
           </p:nvPr>
         </p:nvSpPr>
         <p:spPr/>
@@ -559,10 +551,6 @@
             <a:pPr lvl="0">
               <a:defRPr/>
             </a:pPr>
-            <a:r>
-              <a:rPr lang="ko-KR" altLang="en-US"/>
-              <a:t/>
-            </a:r>
             <a:endParaRPr lang="ko-KR" altLang="en-US"/>
           </a:p>
         </p:txBody>
@@ -605,7 +593,7 @@
 </file>
 
 <file path=ppt/notesSlides/notesSlide2.xml><?xml version="1.0" encoding="utf-8"?>
-<p:notes xmlns:r="http://schemas.openxmlformats.org/officeDocument/2006/relationships" xmlns:c="http://schemas.openxmlformats.org/drawingml/2006/chart" xmlns:a="http://schemas.openxmlformats.org/drawingml/2006/main" xmlns:dgm="http://schemas.openxmlformats.org/drawingml/2006/diagram" xmlns:dsp="http://schemas.microsoft.com/office/drawing/2008/diagram" xmlns:p="http://schemas.openxmlformats.org/presentationml/2006/main">
+<p:notes xmlns:a="http://schemas.openxmlformats.org/drawingml/2006/main" xmlns:r="http://schemas.openxmlformats.org/officeDocument/2006/relationships" xmlns:p="http://schemas.openxmlformats.org/presentationml/2006/main">
   <p:cSld>
     <p:spTree>
       <p:nvGrpSpPr>
@@ -628,7 +616,7 @@
             <a:spLocks noGrp="1" noRot="1" noChangeAspect="1" noTextEdit="1"/>
           </p:cNvSpPr>
           <p:nvPr>
-            <p:ph type="sldImg" idx="0"/>
+            <p:ph type="sldImg"/>
           </p:nvPr>
         </p:nvSpPr>
         <p:spPr/>
@@ -651,10 +639,6 @@
             <a:pPr lvl="0">
               <a:defRPr/>
             </a:pPr>
-            <a:r>
-              <a:rPr lang="ko-KR" altLang="en-US"/>
-              <a:t/>
-            </a:r>
             <a:endParaRPr lang="ko-KR" altLang="en-US"/>
           </a:p>
         </p:txBody>
@@ -697,7 +681,7 @@
 </file>
 
 <file path=ppt/notesSlides/notesSlide3.xml><?xml version="1.0" encoding="utf-8"?>
-<p:notes xmlns:r="http://schemas.openxmlformats.org/officeDocument/2006/relationships" xmlns:c="http://schemas.openxmlformats.org/drawingml/2006/chart" xmlns:a="http://schemas.openxmlformats.org/drawingml/2006/main" xmlns:dgm="http://schemas.openxmlformats.org/drawingml/2006/diagram" xmlns:dsp="http://schemas.microsoft.com/office/drawing/2008/diagram" xmlns:p="http://schemas.openxmlformats.org/presentationml/2006/main">
+<p:notes xmlns:a="http://schemas.openxmlformats.org/drawingml/2006/main" xmlns:r="http://schemas.openxmlformats.org/officeDocument/2006/relationships" xmlns:p="http://schemas.openxmlformats.org/presentationml/2006/main">
   <p:cSld>
     <p:spTree>
       <p:nvGrpSpPr>
@@ -720,7 +704,7 @@
             <a:spLocks noGrp="1" noRot="1" noChangeAspect="1" noTextEdit="1"/>
           </p:cNvSpPr>
           <p:nvPr>
-            <p:ph type="sldImg" idx="0"/>
+            <p:ph type="sldImg"/>
           </p:nvPr>
         </p:nvSpPr>
         <p:spPr/>
@@ -763,15 +747,6 @@
               </a:rPr>
               <a:t>배경 및 필요성</a:t>
             </a:r>
-            <a:endParaRPr lang="ko-KR" altLang="en-US" sz="1200" b="0" i="0" u="none" strike="noStrike" kern="1200">
-              <a:solidFill>
-                <a:schemeClr val="tx1"/>
-              </a:solidFill>
-              <a:effectLst/>
-              <a:latin typeface="+mn-lt"/>
-              <a:ea typeface="+mn-ea"/>
-              <a:cs typeface="+mn-cs"/>
-            </a:endParaRPr>
           </a:p>
           <a:p>
             <a:pPr lvl="2" rtl="0">
@@ -825,15 +800,6 @@
               </a:rPr>
               <a:t>.</a:t>
             </a:r>
-            <a:endParaRPr lang="en-US" altLang="ko-KR" sz="1200" b="0" i="0" u="none" strike="noStrike" kern="1200">
-              <a:solidFill>
-                <a:schemeClr val="tx1"/>
-              </a:solidFill>
-              <a:effectLst/>
-              <a:latin typeface="+mn-lt"/>
-              <a:ea typeface="+mn-ea"/>
-              <a:cs typeface="+mn-cs"/>
-            </a:endParaRPr>
           </a:p>
           <a:p>
             <a:pPr lvl="3" rtl="0">
@@ -875,15 +841,6 @@
               </a:rPr>
               <a:t>및 식별을 하여 소통 장애 문제 해결 필요 </a:t>
             </a:r>
-            <a:endParaRPr lang="ko-KR" altLang="en-US" sz="1200" b="0" i="0" u="none" strike="noStrike" kern="1200">
-              <a:solidFill>
-                <a:schemeClr val="tx1"/>
-              </a:solidFill>
-              <a:effectLst/>
-              <a:latin typeface="+mn-lt"/>
-              <a:ea typeface="+mn-ea"/>
-              <a:cs typeface="+mn-cs"/>
-            </a:endParaRPr>
           </a:p>
           <a:p>
             <a:pPr lvl="3" rtl="0">
@@ -925,15 +882,6 @@
               </a:rPr>
               <a:t>관리가 필요</a:t>
             </a:r>
-            <a:endParaRPr lang="ko-KR" altLang="en-US" sz="1200" b="0" i="0" u="none" strike="noStrike" kern="1200">
-              <a:solidFill>
-                <a:schemeClr val="tx1"/>
-              </a:solidFill>
-              <a:effectLst/>
-              <a:latin typeface="+mn-lt"/>
-              <a:ea typeface="+mn-ea"/>
-              <a:cs typeface="+mn-cs"/>
-            </a:endParaRPr>
           </a:p>
           <a:p>
             <a:pPr lvl="3" rtl="0">
@@ -951,15 +899,6 @@
               </a:rPr>
               <a:t>사용자가 주제별로 쉽게 대화를 구성할 수 있고 그룹 구성원을 관리 할 수 있는 기능을 제공할 필요성</a:t>
             </a:r>
-            <a:endParaRPr lang="ko-KR" altLang="en-US" sz="1200" b="0" i="0" u="none" strike="noStrike" kern="1200">
-              <a:solidFill>
-                <a:schemeClr val="tx1"/>
-              </a:solidFill>
-              <a:effectLst/>
-              <a:latin typeface="+mn-lt"/>
-              <a:ea typeface="+mn-ea"/>
-              <a:cs typeface="+mn-cs"/>
-            </a:endParaRPr>
           </a:p>
           <a:p>
             <a:pPr lvl="2" rtl="0">
@@ -1013,15 +952,6 @@
               </a:rPr>
               <a:t>.</a:t>
             </a:r>
-            <a:endParaRPr lang="en-US" altLang="ko-KR" sz="1200" b="0" i="0" u="none" strike="noStrike" kern="1200">
-              <a:solidFill>
-                <a:schemeClr val="tx1"/>
-              </a:solidFill>
-              <a:effectLst/>
-              <a:latin typeface="+mn-lt"/>
-              <a:ea typeface="+mn-ea"/>
-              <a:cs typeface="+mn-cs"/>
-            </a:endParaRPr>
           </a:p>
           <a:p>
             <a:pPr lvl="2" rtl="0">
@@ -1051,15 +981,6 @@
               </a:rPr>
               <a:t>.</a:t>
             </a:r>
-            <a:endParaRPr lang="en-US" altLang="ko-KR" sz="1200" b="0" i="0" u="none" strike="noStrike" kern="1200">
-              <a:solidFill>
-                <a:schemeClr val="tx1"/>
-              </a:solidFill>
-              <a:effectLst/>
-              <a:latin typeface="+mn-lt"/>
-              <a:ea typeface="+mn-ea"/>
-              <a:cs typeface="+mn-cs"/>
-            </a:endParaRPr>
           </a:p>
           <a:p>
             <a:pPr lvl="1" rtl="0">
@@ -1077,15 +998,6 @@
               </a:rPr>
               <a:t>목적</a:t>
             </a:r>
-            <a:endParaRPr lang="ko-KR" altLang="en-US" sz="1200" b="0" i="0" u="none" strike="noStrike" kern="1200">
-              <a:solidFill>
-                <a:schemeClr val="tx1"/>
-              </a:solidFill>
-              <a:effectLst/>
-              <a:latin typeface="+mn-lt"/>
-              <a:ea typeface="+mn-ea"/>
-              <a:cs typeface="+mn-cs"/>
-            </a:endParaRPr>
           </a:p>
           <a:p>
             <a:pPr lvl="2" rtl="0">
@@ -1139,15 +1051,6 @@
               </a:rPr>
               <a:t>. </a:t>
             </a:r>
-            <a:endParaRPr lang="en-US" altLang="ko-KR" sz="1200" b="0" i="0" u="none" strike="noStrike" kern="1200">
-              <a:solidFill>
-                <a:schemeClr val="tx1"/>
-              </a:solidFill>
-              <a:effectLst/>
-              <a:latin typeface="+mn-lt"/>
-              <a:ea typeface="+mn-ea"/>
-              <a:cs typeface="+mn-cs"/>
-            </a:endParaRPr>
           </a:p>
           <a:p>
             <a:pPr lvl="2" rtl="0">
@@ -1165,15 +1068,6 @@
               </a:rPr>
               <a:t>채팅에 커뮤니티의 카테고리를 융합하여 대화의 목표에 집중할 수 있는 환경 조성</a:t>
             </a:r>
-            <a:endParaRPr lang="ko-KR" altLang="en-US" sz="1200" b="0" i="0" u="none" strike="noStrike" kern="1200">
-              <a:solidFill>
-                <a:schemeClr val="tx1"/>
-              </a:solidFill>
-              <a:effectLst/>
-              <a:latin typeface="+mn-lt"/>
-              <a:ea typeface="+mn-ea"/>
-              <a:cs typeface="+mn-cs"/>
-            </a:endParaRPr>
           </a:p>
           <a:p>
             <a:pPr lvl="2" rtl="0">
@@ -1203,15 +1097,6 @@
               </a:rPr>
               <a:t>.</a:t>
             </a:r>
-            <a:endParaRPr lang="en-US" altLang="ko-KR" sz="1200" b="0" i="0" u="none" strike="noStrike" kern="1200">
-              <a:solidFill>
-                <a:schemeClr val="tx1"/>
-              </a:solidFill>
-              <a:effectLst/>
-              <a:latin typeface="+mn-lt"/>
-              <a:ea typeface="+mn-ea"/>
-              <a:cs typeface="+mn-cs"/>
-            </a:endParaRPr>
           </a:p>
           <a:p>
             <a:pPr lvl="0">
@@ -1259,7 +1144,7 @@
 </file>
 
 <file path=ppt/notesSlides/notesSlide4.xml><?xml version="1.0" encoding="utf-8"?>
-<p:notes xmlns:r="http://schemas.openxmlformats.org/officeDocument/2006/relationships" xmlns:c="http://schemas.openxmlformats.org/drawingml/2006/chart" xmlns:a="http://schemas.openxmlformats.org/drawingml/2006/main" xmlns:dgm="http://schemas.openxmlformats.org/drawingml/2006/diagram" xmlns:dsp="http://schemas.microsoft.com/office/drawing/2008/diagram" xmlns:p="http://schemas.openxmlformats.org/presentationml/2006/main">
+<p:notes xmlns:a="http://schemas.openxmlformats.org/drawingml/2006/main" xmlns:r="http://schemas.openxmlformats.org/officeDocument/2006/relationships" xmlns:p="http://schemas.openxmlformats.org/presentationml/2006/main">
   <p:cSld>
     <p:spTree>
       <p:nvGrpSpPr>
@@ -1282,7 +1167,7 @@
             <a:spLocks noGrp="1" noRot="1" noChangeAspect="1" noTextEdit="1"/>
           </p:cNvSpPr>
           <p:nvPr>
-            <p:ph type="sldImg" idx="0"/>
+            <p:ph type="sldImg"/>
           </p:nvPr>
         </p:nvSpPr>
         <p:spPr/>
@@ -1517,7 +1402,7 @@
           <a:p>
             <a:fld id="{29F15912-DF5E-4479-8ABA-4F9CDA3ED278}" type="datetime1">
               <a:rPr lang="ko-KR" altLang="en-US" smtClean="0"/>
-              <a:t>2019-03-14</a:t>
+              <a:t>2019-03-19</a:t>
             </a:fld>
             <a:endParaRPr lang="ko-KR" altLang="en-US"/>
           </a:p>
@@ -1747,7 +1632,7 @@
           <a:p>
             <a:fld id="{8EFF1178-C9DA-4A17-935F-3345920E04A4}" type="datetime1">
               <a:rPr lang="ko-KR" altLang="en-US" smtClean="0"/>
-              <a:t>2019-03-14</a:t>
+              <a:t>2019-03-19</a:t>
             </a:fld>
             <a:endParaRPr lang="ko-KR" altLang="en-US"/>
           </a:p>
@@ -1955,7 +1840,7 @@
           <a:p>
             <a:fld id="{4FDCB9C2-06B3-41DA-922C-914583460BB4}" type="datetime1">
               <a:rPr lang="ko-KR" altLang="en-US" smtClean="0"/>
-              <a:t>2019-03-14</a:t>
+              <a:t>2019-03-19</a:t>
             </a:fld>
             <a:endParaRPr lang="ko-KR" altLang="en-US"/>
           </a:p>
@@ -2490,7 +2375,7 @@
           <a:p>
             <a:fld id="{04A7FE38-C1AE-4297-8975-73AC936CB7DB}" type="datetime1">
               <a:rPr lang="ko-KR" altLang="en-US" smtClean="0"/>
-              <a:t>2019-03-14</a:t>
+              <a:t>2019-03-19</a:t>
             </a:fld>
             <a:endParaRPr lang="ko-KR" altLang="en-US"/>
           </a:p>
@@ -2755,7 +2640,7 @@
           <a:p>
             <a:fld id="{5C827732-E306-466E-9D6C-0D747ECB1B5A}" type="datetime1">
               <a:rPr lang="ko-KR" altLang="en-US" smtClean="0"/>
-              <a:t>2019-03-14</a:t>
+              <a:t>2019-03-19</a:t>
             </a:fld>
             <a:endParaRPr lang="ko-KR" altLang="en-US"/>
           </a:p>
@@ -3167,7 +3052,7 @@
           <a:p>
             <a:fld id="{4CEC7976-A2BB-4DE3-A696-E4E3541EFEEF}" type="datetime1">
               <a:rPr lang="ko-KR" altLang="en-US" smtClean="0"/>
-              <a:t>2019-03-14</a:t>
+              <a:t>2019-03-19</a:t>
             </a:fld>
             <a:endParaRPr lang="ko-KR" altLang="en-US"/>
           </a:p>
@@ -3308,7 +3193,7 @@
           <a:p>
             <a:fld id="{318AF65D-C257-4286-B463-075C93CF8C96}" type="datetime1">
               <a:rPr lang="ko-KR" altLang="en-US" smtClean="0"/>
-              <a:t>2019-03-14</a:t>
+              <a:t>2019-03-19</a:t>
             </a:fld>
             <a:endParaRPr lang="ko-KR" altLang="en-US"/>
           </a:p>
@@ -3453,7 +3338,7 @@
           <a:p>
             <a:fld id="{0AA42013-848C-4A3F-86D3-B475240CD4F5}" type="datetime1">
               <a:rPr lang="ko-KR" altLang="en-US" smtClean="0"/>
-              <a:t>2019-03-14</a:t>
+              <a:t>2019-03-19</a:t>
             </a:fld>
             <a:endParaRPr lang="ko-KR" altLang="en-US"/>
           </a:p>
@@ -3895,7 +3780,7 @@
           <a:p>
             <a:fld id="{C997F6DB-815A-473E-81D5-DD0145FF2881}" type="datetime1">
               <a:rPr lang="ko-KR" altLang="en-US" smtClean="0"/>
-              <a:t>2019-03-14</a:t>
+              <a:t>2019-03-19</a:t>
             </a:fld>
             <a:endParaRPr lang="ko-KR" altLang="en-US"/>
           </a:p>
@@ -4183,7 +4068,7 @@
           <a:p>
             <a:fld id="{E15BBF43-EF0F-4A85-AEE0-1C2B102823CB}" type="datetime1">
               <a:rPr lang="ko-KR" altLang="en-US" smtClean="0"/>
-              <a:t>2019-03-14</a:t>
+              <a:t>2019-03-19</a:t>
             </a:fld>
             <a:endParaRPr lang="ko-KR" altLang="en-US"/>
           </a:p>
@@ -4424,7 +4309,7 @@
           <a:p>
             <a:fld id="{4041896F-2038-4C9C-A491-E790942C54F5}" type="datetime1">
               <a:rPr lang="ko-KR" altLang="en-US" smtClean="0"/>
-              <a:t>2019-03-14</a:t>
+              <a:t>2019-03-19</a:t>
             </a:fld>
             <a:endParaRPr lang="ko-KR" altLang="en-US"/>
           </a:p>
@@ -4826,7 +4711,7 @@
 </file>
 
 <file path=ppt/slides/slide1.xml><?xml version="1.0" encoding="utf-8"?>
-<p:sld xmlns:r="http://schemas.openxmlformats.org/officeDocument/2006/relationships" xmlns:c="http://schemas.openxmlformats.org/drawingml/2006/chart" xmlns:a="http://schemas.openxmlformats.org/drawingml/2006/main" xmlns:dgm="http://schemas.openxmlformats.org/drawingml/2006/diagram" xmlns:dsp="http://schemas.microsoft.com/office/drawing/2008/diagram" xmlns:p="http://schemas.openxmlformats.org/presentationml/2006/main">
+<p:sld xmlns:a="http://schemas.openxmlformats.org/drawingml/2006/main" xmlns:r="http://schemas.openxmlformats.org/officeDocument/2006/relationships" xmlns:p="http://schemas.openxmlformats.org/presentationml/2006/main">
   <p:cSld>
     <p:spTree>
       <p:nvGrpSpPr>
@@ -4849,7 +4734,7 @@
             <a:spLocks noGrp="1"/>
           </p:cNvSpPr>
           <p:nvPr>
-            <p:ph type="ctrTitle" idx="0"/>
+            <p:ph type="ctrTitle"/>
           </p:nvPr>
         </p:nvSpPr>
         <p:spPr/>
@@ -4864,7 +4749,6 @@
               <a:rPr lang="ko-KR" altLang="en-US"/>
               <a:t>지도 기반 채팅 커뮤니티</a:t>
             </a:r>
-            <a:endParaRPr lang="ko-KR" altLang="en-US"/>
           </a:p>
         </p:txBody>
       </p:sp>
@@ -4915,7 +4799,6 @@
               <a:rPr lang="en-US" altLang="ko-KR" sz="2000"/>
               <a:t>(32160974)</a:t>
             </a:r>
-            <a:endParaRPr lang="en-US" altLang="ko-KR" sz="2000"/>
           </a:p>
           <a:p>
             <a:pPr lvl="0">
@@ -4929,7 +4812,6 @@
               <a:rPr lang="en-US" altLang="ko-KR" sz="2000"/>
               <a:t>(32151495)</a:t>
             </a:r>
-            <a:endParaRPr lang="en-US" altLang="ko-KR" sz="2000"/>
           </a:p>
           <a:p>
             <a:pPr lvl="0">
@@ -4944,11 +4826,11 @@
   <p:clrMapOvr>
     <a:masterClrMapping/>
   </p:clrMapOvr>
-  <mc:AlternateContent xmlns:mc="http://schemas.openxmlformats.org/markup-compatibility/2006">
-    <mc:Choice xmlns:p14="http://schemas.microsoft.com/office/powerpoint/2010/main" Requires="p14">
-      <p:transition xmlns:mc="http://schemas.openxmlformats.org/markup-compatibility/2006" xmlns:p14="http://schemas.microsoft.com/office/powerpoint/2010/main" mc:Ignorable="p14" p14:dur="500"/>
+  <mc:AlternateContent xmlns:mc="http://schemas.openxmlformats.org/markup-compatibility/2006" xmlns:p14="http://schemas.microsoft.com/office/powerpoint/2010/main">
+    <mc:Choice Requires="p14">
+      <p:transition/>
     </mc:Choice>
-    <mc:Fallback>
+    <mc:Fallback xmlns:dsp="http://schemas.microsoft.com/office/drawing/2008/diagram" xmlns:dgm="http://schemas.openxmlformats.org/drawingml/2006/diagram" xmlns:c="http://schemas.openxmlformats.org/drawingml/2006/chart" xmlns="">
       <p:transition/>
     </mc:Fallback>
   </mc:AlternateContent>
@@ -6465,7 +6347,7 @@
 </file>
 
 <file path=ppt/slides/slide13.xml><?xml version="1.0" encoding="utf-8"?>
-<p:sld xmlns:r="http://schemas.openxmlformats.org/officeDocument/2006/relationships" xmlns:c="http://schemas.openxmlformats.org/drawingml/2006/chart" xmlns:a="http://schemas.openxmlformats.org/drawingml/2006/main" xmlns:dgm="http://schemas.openxmlformats.org/drawingml/2006/diagram" xmlns:dsp="http://schemas.microsoft.com/office/drawing/2008/diagram" xmlns:p="http://schemas.openxmlformats.org/presentationml/2006/main">
+<p:sld xmlns:a="http://schemas.openxmlformats.org/drawingml/2006/main" xmlns:r="http://schemas.openxmlformats.org/officeDocument/2006/relationships" xmlns:p="http://schemas.openxmlformats.org/presentationml/2006/main">
   <p:cSld>
     <p:spTree>
       <p:nvGrpSpPr>
@@ -6503,7 +6385,6 @@
               <a:rPr lang="ko-KR" altLang="en-US"/>
               <a:t>협업하는 방법</a:t>
             </a:r>
-            <a:endParaRPr lang="ko-KR" altLang="en-US"/>
           </a:p>
           <a:p>
             <a:pPr marL="0" indent="0">
@@ -6520,7 +6401,6 @@
               <a:rPr lang="ko-KR" altLang="en-US"/>
               <a:t>개발환경</a:t>
             </a:r>
-            <a:endParaRPr lang="ko-KR" altLang="en-US"/>
           </a:p>
         </p:txBody>
       </p:sp>
@@ -6560,7 +6440,7 @@
             <a:spLocks noGrp="1"/>
           </p:cNvSpPr>
           <p:nvPr>
-            <p:ph type="title" idx="0"/>
+            <p:ph type="title"/>
           </p:nvPr>
         </p:nvSpPr>
         <p:spPr/>
@@ -6590,11 +6470,11 @@
   <p:clrMapOvr>
     <a:masterClrMapping/>
   </p:clrMapOvr>
-  <mc:AlternateContent xmlns:mc="http://schemas.openxmlformats.org/markup-compatibility/2006">
-    <mc:Choice xmlns:p14="http://schemas.microsoft.com/office/powerpoint/2010/main" Requires="p14">
-      <p:transition xmlns:mc="http://schemas.openxmlformats.org/markup-compatibility/2006" xmlns:p14="http://schemas.microsoft.com/office/powerpoint/2010/main" mc:Ignorable="p14" p14:dur="500"/>
+  <mc:AlternateContent xmlns:mc="http://schemas.openxmlformats.org/markup-compatibility/2006" xmlns:p14="http://schemas.microsoft.com/office/powerpoint/2010/main">
+    <mc:Choice Requires="p14">
+      <p:transition/>
     </mc:Choice>
-    <mc:Fallback>
+    <mc:Fallback xmlns:dsp="http://schemas.microsoft.com/office/drawing/2008/diagram" xmlns:dgm="http://schemas.openxmlformats.org/drawingml/2006/diagram" xmlns:c="http://schemas.openxmlformats.org/drawingml/2006/chart" xmlns="">
       <p:transition/>
     </mc:Fallback>
   </mc:AlternateContent>
@@ -6696,7 +6576,7 @@
 </file>
 
 <file path=ppt/slides/slide2.xml><?xml version="1.0" encoding="utf-8"?>
-<p:sld xmlns:r="http://schemas.openxmlformats.org/officeDocument/2006/relationships" xmlns:c="http://schemas.openxmlformats.org/drawingml/2006/chart" xmlns:a="http://schemas.openxmlformats.org/drawingml/2006/main" xmlns:dgm="http://schemas.openxmlformats.org/drawingml/2006/diagram" xmlns:dsp="http://schemas.microsoft.com/office/drawing/2008/diagram" xmlns:p="http://schemas.openxmlformats.org/presentationml/2006/main">
+<p:sld xmlns:a="http://schemas.openxmlformats.org/drawingml/2006/main" xmlns:r="http://schemas.openxmlformats.org/officeDocument/2006/relationships" xmlns:p="http://schemas.openxmlformats.org/presentationml/2006/main">
   <p:cSld>
     <p:spTree>
       <p:nvGrpSpPr>
@@ -6748,7 +6628,7 @@
             <a:spLocks noGrp="1"/>
           </p:cNvSpPr>
           <p:nvPr>
-            <p:ph type="title" idx="0"/>
+            <p:ph type="title"/>
           </p:nvPr>
         </p:nvSpPr>
         <p:spPr/>
@@ -6765,7 +6645,6 @@
               <a:rPr lang="ko-KR" altLang="en-US"/>
               <a:t>목차</a:t>
             </a:r>
-            <a:endParaRPr lang="ko-KR" altLang="en-US"/>
           </a:p>
         </p:txBody>
       </p:sp>
@@ -6807,7 +6686,6 @@
               <a:rPr lang="ko-KR" altLang="en-US" sz="4000"/>
               <a:t>팀 소개 </a:t>
             </a:r>
-            <a:endParaRPr lang="ko-KR" altLang="en-US" sz="4000"/>
           </a:p>
           <a:p>
             <a:pPr marL="742950" indent="-742950">
@@ -6826,7 +6704,6 @@
               <a:rPr lang="ko-KR" altLang="en-US" sz="4000"/>
               <a:t>아이디어 소개</a:t>
             </a:r>
-            <a:endParaRPr lang="ko-KR" altLang="en-US" sz="4000"/>
           </a:p>
           <a:p>
             <a:pPr marL="742950" indent="-742950">
@@ -6841,7 +6718,6 @@
               <a:rPr lang="ko-KR" altLang="en-US" sz="4000"/>
               <a:t> 시나리오</a:t>
             </a:r>
-            <a:endParaRPr lang="ko-KR" altLang="en-US" sz="4000"/>
           </a:p>
           <a:p>
             <a:pPr marL="742950" indent="-742950">
@@ -6856,7 +6732,6 @@
               <a:rPr lang="ko-KR" altLang="en-US" sz="4000"/>
               <a:t> 프로토타입</a:t>
             </a:r>
-            <a:endParaRPr lang="ko-KR" altLang="en-US" sz="4000"/>
           </a:p>
           <a:p>
             <a:pPr marL="514350" indent="-514350">
@@ -6873,11 +6748,11 @@
   <p:clrMapOvr>
     <a:masterClrMapping/>
   </p:clrMapOvr>
-  <mc:AlternateContent xmlns:mc="http://schemas.openxmlformats.org/markup-compatibility/2006">
-    <mc:Choice xmlns:p14="http://schemas.microsoft.com/office/powerpoint/2010/main" Requires="p14">
-      <p:transition xmlns:mc="http://schemas.openxmlformats.org/markup-compatibility/2006" xmlns:p14="http://schemas.microsoft.com/office/powerpoint/2010/main" mc:Ignorable="p14" p14:dur="500"/>
+  <mc:AlternateContent xmlns:mc="http://schemas.openxmlformats.org/markup-compatibility/2006" xmlns:p14="http://schemas.microsoft.com/office/powerpoint/2010/main">
+    <mc:Choice Requires="p14">
+      <p:transition/>
     </mc:Choice>
-    <mc:Fallback>
+    <mc:Fallback xmlns:dsp="http://schemas.microsoft.com/office/drawing/2008/diagram" xmlns:dgm="http://schemas.openxmlformats.org/drawingml/2006/diagram" xmlns:c="http://schemas.openxmlformats.org/drawingml/2006/chart" xmlns="">
       <p:transition/>
     </mc:Fallback>
   </mc:AlternateContent>
@@ -6885,7 +6760,7 @@
 </file>
 
 <file path=ppt/slides/slide3.xml><?xml version="1.0" encoding="utf-8"?>
-<p:sld xmlns:r="http://schemas.openxmlformats.org/officeDocument/2006/relationships" xmlns:c="http://schemas.openxmlformats.org/drawingml/2006/chart" xmlns:a="http://schemas.openxmlformats.org/drawingml/2006/main" xmlns:dgm="http://schemas.openxmlformats.org/drawingml/2006/diagram" xmlns:dsp="http://schemas.microsoft.com/office/drawing/2008/diagram" xmlns:p="http://schemas.openxmlformats.org/presentationml/2006/main">
+<p:sld xmlns:a="http://schemas.openxmlformats.org/drawingml/2006/main" xmlns:r="http://schemas.openxmlformats.org/officeDocument/2006/relationships" xmlns:p="http://schemas.openxmlformats.org/presentationml/2006/main">
   <p:cSld>
     <p:spTree>
       <p:nvGrpSpPr>
@@ -6937,7 +6812,7 @@
             <a:spLocks noGrp="1"/>
           </p:cNvSpPr>
           <p:nvPr>
-            <p:ph type="title" idx="0"/>
+            <p:ph type="title"/>
           </p:nvPr>
         </p:nvSpPr>
         <p:spPr/>
@@ -6954,7 +6829,6 @@
               <a:rPr lang="ko-KR" altLang="en-US"/>
               <a:t>팀소개</a:t>
             </a:r>
-            <a:endParaRPr lang="ko-KR" altLang="en-US"/>
           </a:p>
         </p:txBody>
       </p:sp>
@@ -6972,7 +6846,12 @@
           <a:prstGeom prst="ellipse">
             <a:avLst/>
           </a:prstGeom>
-          <a:noFill/>
+          <a:blipFill>
+            <a:blip r:embed="rId2"/>
+            <a:stretch>
+              <a:fillRect/>
+            </a:stretch>
+          </a:blipFill>
         </p:spPr>
         <p:style>
           <a:lnRef idx="2">
@@ -7016,7 +6895,7 @@
             <a:avLst/>
           </a:prstGeom>
           <a:blipFill rotWithShape="1">
-            <a:blip r:embed="rId2">
+            <a:blip r:embed="rId3">
               <a:alphaModFix/>
               <a:lum/>
             </a:blip>
@@ -7068,7 +6947,7 @@
             <a:avLst/>
           </a:prstGeom>
           <a:blipFill rotWithShape="1">
-            <a:blip r:embed="rId3"/>
+            <a:blip r:embed="rId4"/>
             <a:stretch>
               <a:fillRect/>
             </a:stretch>
@@ -7130,7 +7009,6 @@
               <a:rPr lang="ko-KR" altLang="en-US" sz="2400"/>
               <a:t>김장현</a:t>
             </a:r>
-            <a:endParaRPr lang="ko-KR" altLang="en-US" sz="2400"/>
           </a:p>
         </p:txBody>
       </p:sp>
@@ -7171,7 +7049,6 @@
               <a:rPr lang="ko-KR" altLang="en-US"/>
               <a:t>테스트</a:t>
             </a:r>
-            <a:endParaRPr lang="ko-KR" altLang="en-US"/>
           </a:p>
         </p:txBody>
       </p:sp>
@@ -7204,7 +7081,6 @@
               <a:rPr lang="ko-KR" altLang="en-US" sz="2400"/>
               <a:t>류다인</a:t>
             </a:r>
-            <a:endParaRPr lang="ko-KR" altLang="en-US" sz="2400"/>
           </a:p>
         </p:txBody>
       </p:sp>
@@ -7241,7 +7117,6 @@
               <a:rPr lang="ko-KR" altLang="en-US"/>
               <a:t>테스트</a:t>
             </a:r>
-            <a:endParaRPr lang="ko-KR" altLang="en-US"/>
           </a:p>
         </p:txBody>
       </p:sp>
@@ -7274,7 +7149,6 @@
               <a:rPr lang="ko-KR" altLang="en-US" sz="2400"/>
               <a:t>박은영</a:t>
             </a:r>
-            <a:endParaRPr lang="ko-KR" altLang="en-US" sz="2400"/>
           </a:p>
         </p:txBody>
       </p:sp>
@@ -7320,11 +7194,11 @@
   <p:clrMapOvr>
     <a:masterClrMapping/>
   </p:clrMapOvr>
-  <mc:AlternateContent xmlns:mc="http://schemas.openxmlformats.org/markup-compatibility/2006">
-    <mc:Choice xmlns:p14="http://schemas.microsoft.com/office/powerpoint/2010/main" Requires="p14">
-      <p:transition xmlns:mc="http://schemas.openxmlformats.org/markup-compatibility/2006" xmlns:p14="http://schemas.microsoft.com/office/powerpoint/2010/main" mc:Ignorable="p14" p14:dur="500"/>
+  <mc:AlternateContent xmlns:mc="http://schemas.openxmlformats.org/markup-compatibility/2006" xmlns:p14="http://schemas.microsoft.com/office/powerpoint/2010/main">
+    <mc:Choice Requires="p14">
+      <p:transition/>
     </mc:Choice>
-    <mc:Fallback>
+    <mc:Fallback xmlns:dsp="http://schemas.microsoft.com/office/drawing/2008/diagram" xmlns:dgm="http://schemas.openxmlformats.org/drawingml/2006/diagram" xmlns:c="http://schemas.openxmlformats.org/drawingml/2006/chart" xmlns="">
       <p:transition/>
     </mc:Fallback>
   </mc:AlternateContent>
@@ -10023,49 +9897,49 @@
 </file>
 
 <file path=ppt/theme/theme1.xml><?xml version="1.0" encoding="utf-8"?>
-<a:theme xmlns:r="http://schemas.openxmlformats.org/officeDocument/2006/relationships" xmlns:c="http://schemas.openxmlformats.org/drawingml/2006/chart" xmlns:dgm="http://schemas.openxmlformats.org/drawingml/2006/diagram" xmlns:dsp="http://schemas.microsoft.com/office/drawing/2008/diagram" xmlns:a="http://schemas.openxmlformats.org/drawingml/2006/main" xmlns:pic="http://schemas.openxmlformats.org/drawingml/2006/picture" xmlns:wp="http://schemas.openxmlformats.org/drawingml/2006/wordprocessingDrawing" xmlns:xdr="http://schemas.openxmlformats.org/drawingml/2006/spreadsheetDrawing" xmlns:p="http://schemas.openxmlformats.org/presentationml/2006/main" name="Office 테마">
+<a:theme xmlns:a="http://schemas.openxmlformats.org/drawingml/2006/main" name="Office 테마">
   <a:themeElements>
     <a:clrScheme name="Office">
       <a:dk1>
         <a:sysClr val="windowText" lastClr="000000"/>
       </a:dk1>
       <a:lt1>
-        <a:sysClr val="window" lastClr="ffffff"/>
+        <a:sysClr val="window" lastClr="FFFFFF"/>
       </a:lt1>
       <a:dk2>
-        <a:srgbClr val="44546a"/>
+        <a:srgbClr val="44546A"/>
       </a:dk2>
       <a:lt2>
-        <a:srgbClr val="e7e6e6"/>
+        <a:srgbClr val="E7E6E6"/>
       </a:lt2>
       <a:accent1>
-        <a:srgbClr val="4472c4"/>
+        <a:srgbClr val="4472C4"/>
       </a:accent1>
       <a:accent2>
-        <a:srgbClr val="ed7d31"/>
+        <a:srgbClr val="ED7D31"/>
       </a:accent2>
       <a:accent3>
-        <a:srgbClr val="a5a5a5"/>
+        <a:srgbClr val="A5A5A5"/>
       </a:accent3>
       <a:accent4>
-        <a:srgbClr val="ffc000"/>
+        <a:srgbClr val="FFC000"/>
       </a:accent4>
       <a:accent5>
-        <a:srgbClr val="5b9bd5"/>
+        <a:srgbClr val="5B9BD5"/>
       </a:accent5>
       <a:accent6>
-        <a:srgbClr val="70ad47"/>
+        <a:srgbClr val="70AD47"/>
       </a:accent6>
       <a:hlink>
-        <a:srgbClr val="0563c1"/>
+        <a:srgbClr val="0563C1"/>
       </a:hlink>
       <a:folHlink>
-        <a:srgbClr val="954f72"/>
+        <a:srgbClr val="954F72"/>
       </a:folHlink>
     </a:clrScheme>
     <a:fontScheme name="Office">
       <a:majorFont>
-        <a:latin typeface="맑은 고딕" panose="20"/>
+        <a:latin typeface="맑은 고딕" panose="20000000000000000000"/>
         <a:ea typeface=""/>
         <a:cs typeface=""/>
         <a:font script="Jpan" typeface="Yu Gothic Light"/>
@@ -10117,7 +9991,7 @@
         <a:font script="Tfng" typeface="Ebrima"/>
       </a:majorFont>
       <a:minorFont>
-        <a:latin typeface="맑은 고딕" panose="20"/>
+        <a:latin typeface="맑은 고딕" panose="20000000000000000000"/>
         <a:ea typeface=""/>
         <a:cs typeface=""/>
         <a:font script="Jpan" typeface="Yu Gothic"/>
@@ -10307,53 +10181,55 @@
       </a:bgFillStyleLst>
     </a:fmtScheme>
   </a:themeElements>
+  <a:objectDefaults/>
+  <a:extraClrSchemeLst/>
 </a:theme>
 </file>
 
 <file path=ppt/theme/theme2.xml><?xml version="1.0" encoding="utf-8"?>
-<a:theme xmlns:r="http://schemas.openxmlformats.org/officeDocument/2006/relationships" xmlns:c="http://schemas.openxmlformats.org/drawingml/2006/chart" xmlns:dgm="http://schemas.openxmlformats.org/drawingml/2006/diagram" xmlns:dsp="http://schemas.microsoft.com/office/drawing/2008/diagram" xmlns:a="http://schemas.openxmlformats.org/drawingml/2006/main" xmlns:pic="http://schemas.openxmlformats.org/drawingml/2006/picture" xmlns:wp="http://schemas.openxmlformats.org/drawingml/2006/wordprocessingDrawing" xmlns:xdr="http://schemas.openxmlformats.org/drawingml/2006/spreadsheetDrawing" xmlns:p="http://schemas.openxmlformats.org/presentationml/2006/main" name="Office 테마">
+<a:theme xmlns:a="http://schemas.openxmlformats.org/drawingml/2006/main" name="Office 테마">
   <a:themeElements>
     <a:clrScheme name="Office">
       <a:dk1>
         <a:sysClr val="windowText" lastClr="000000"/>
       </a:dk1>
       <a:lt1>
-        <a:sysClr val="window" lastClr="ffffff"/>
+        <a:sysClr val="window" lastClr="FFFFFF"/>
       </a:lt1>
       <a:dk2>
-        <a:srgbClr val="44546a"/>
+        <a:srgbClr val="44546A"/>
       </a:dk2>
       <a:lt2>
-        <a:srgbClr val="e7e6e6"/>
+        <a:srgbClr val="E7E6E6"/>
       </a:lt2>
       <a:accent1>
-        <a:srgbClr val="4472c4"/>
+        <a:srgbClr val="4472C4"/>
       </a:accent1>
       <a:accent2>
-        <a:srgbClr val="ed7d31"/>
+        <a:srgbClr val="ED7D31"/>
       </a:accent2>
       <a:accent3>
-        <a:srgbClr val="a5a5a5"/>
+        <a:srgbClr val="A5A5A5"/>
       </a:accent3>
       <a:accent4>
-        <a:srgbClr val="ffc000"/>
+        <a:srgbClr val="FFC000"/>
       </a:accent4>
       <a:accent5>
-        <a:srgbClr val="5b9bd5"/>
+        <a:srgbClr val="5B9BD5"/>
       </a:accent5>
       <a:accent6>
-        <a:srgbClr val="70ad47"/>
+        <a:srgbClr val="70AD47"/>
       </a:accent6>
       <a:hlink>
-        <a:srgbClr val="0563c1"/>
+        <a:srgbClr val="0563C1"/>
       </a:hlink>
       <a:folHlink>
-        <a:srgbClr val="954f72"/>
+        <a:srgbClr val="954F72"/>
       </a:folHlink>
     </a:clrScheme>
     <a:fontScheme name="Office">
       <a:majorFont>
-        <a:latin typeface="맑은 고딕" panose="20"/>
+        <a:latin typeface="맑은 고딕" panose="20000000000000000000"/>
         <a:ea typeface=""/>
         <a:cs typeface=""/>
         <a:font script="Jpan" typeface="Yu Gothic Light"/>
@@ -10405,7 +10281,7 @@
         <a:font script="Tfng" typeface="Ebrima"/>
       </a:majorFont>
       <a:minorFont>
-        <a:latin typeface="맑은 고딕" panose="20"/>
+        <a:latin typeface="맑은 고딕" panose="20000000000000000000"/>
         <a:ea typeface=""/>
         <a:cs typeface=""/>
         <a:font script="Jpan" typeface="Yu Gothic"/>
@@ -10595,5 +10471,7 @@
       </a:bgFillStyleLst>
     </a:fmtScheme>
   </a:themeElements>
+  <a:objectDefaults/>
+  <a:extraClrSchemeLst/>
 </a:theme>
 </file>
</xml_diff>